<commit_message>
PPT beszámoló kiegészítése. dokumentáció hibáinak kijavítása
</commit_message>
<xml_diff>
--- a/Online File Converter - Dokumentáció.pptx
+++ b/Online File Converter - Dokumentáció.pptx
@@ -392,7 +392,7 @@
           <a:p>
             <a:fld id="{89821F94-BC26-4EE4-913A-7B932B9647AE}" type="datetimeFigureOut">
               <a:rPr lang="en-US" smtClean="0"/>
-              <a:t>12/14/2024</a:t>
+              <a:t>1/5/2025</a:t>
             </a:fld>
             <a:endParaRPr lang="en-US"/>
           </a:p>
@@ -590,7 +590,7 @@
           <a:p>
             <a:fld id="{89821F94-BC26-4EE4-913A-7B932B9647AE}" type="datetimeFigureOut">
               <a:rPr lang="en-US" smtClean="0"/>
-              <a:t>12/14/2024</a:t>
+              <a:t>1/5/2025</a:t>
             </a:fld>
             <a:endParaRPr lang="en-US"/>
           </a:p>
@@ -798,7 +798,7 @@
           <a:p>
             <a:fld id="{89821F94-BC26-4EE4-913A-7B932B9647AE}" type="datetimeFigureOut">
               <a:rPr lang="en-US" smtClean="0"/>
-              <a:t>12/14/2024</a:t>
+              <a:t>1/5/2025</a:t>
             </a:fld>
             <a:endParaRPr lang="en-US"/>
           </a:p>
@@ -996,7 +996,7 @@
           <a:p>
             <a:fld id="{89821F94-BC26-4EE4-913A-7B932B9647AE}" type="datetimeFigureOut">
               <a:rPr lang="en-US" smtClean="0"/>
-              <a:t>12/14/2024</a:t>
+              <a:t>1/5/2025</a:t>
             </a:fld>
             <a:endParaRPr lang="en-US"/>
           </a:p>
@@ -1271,7 +1271,7 @@
           <a:p>
             <a:fld id="{89821F94-BC26-4EE4-913A-7B932B9647AE}" type="datetimeFigureOut">
               <a:rPr lang="en-US" smtClean="0"/>
-              <a:t>12/14/2024</a:t>
+              <a:t>1/5/2025</a:t>
             </a:fld>
             <a:endParaRPr lang="en-US"/>
           </a:p>
@@ -1536,7 +1536,7 @@
           <a:p>
             <a:fld id="{89821F94-BC26-4EE4-913A-7B932B9647AE}" type="datetimeFigureOut">
               <a:rPr lang="en-US" smtClean="0"/>
-              <a:t>12/14/2024</a:t>
+              <a:t>1/5/2025</a:t>
             </a:fld>
             <a:endParaRPr lang="en-US"/>
           </a:p>
@@ -1948,7 +1948,7 @@
           <a:p>
             <a:fld id="{89821F94-BC26-4EE4-913A-7B932B9647AE}" type="datetimeFigureOut">
               <a:rPr lang="en-US" smtClean="0"/>
-              <a:t>12/14/2024</a:t>
+              <a:t>1/5/2025</a:t>
             </a:fld>
             <a:endParaRPr lang="en-US"/>
           </a:p>
@@ -2089,7 +2089,7 @@
           <a:p>
             <a:fld id="{89821F94-BC26-4EE4-913A-7B932B9647AE}" type="datetimeFigureOut">
               <a:rPr lang="en-US" smtClean="0"/>
-              <a:t>12/14/2024</a:t>
+              <a:t>1/5/2025</a:t>
             </a:fld>
             <a:endParaRPr lang="en-US"/>
           </a:p>
@@ -2202,7 +2202,7 @@
           <a:p>
             <a:fld id="{89821F94-BC26-4EE4-913A-7B932B9647AE}" type="datetimeFigureOut">
               <a:rPr lang="en-US" smtClean="0"/>
-              <a:t>12/14/2024</a:t>
+              <a:t>1/5/2025</a:t>
             </a:fld>
             <a:endParaRPr lang="en-US"/>
           </a:p>
@@ -2513,7 +2513,7 @@
           <a:p>
             <a:fld id="{89821F94-BC26-4EE4-913A-7B932B9647AE}" type="datetimeFigureOut">
               <a:rPr lang="en-US" smtClean="0"/>
-              <a:t>12/14/2024</a:t>
+              <a:t>1/5/2025</a:t>
             </a:fld>
             <a:endParaRPr lang="en-US"/>
           </a:p>
@@ -2801,7 +2801,7 @@
           <a:p>
             <a:fld id="{89821F94-BC26-4EE4-913A-7B932B9647AE}" type="datetimeFigureOut">
               <a:rPr lang="en-US" smtClean="0"/>
-              <a:t>12/14/2024</a:t>
+              <a:t>1/5/2025</a:t>
             </a:fld>
             <a:endParaRPr lang="en-US"/>
           </a:p>
@@ -3042,7 +3042,7 @@
           <a:p>
             <a:fld id="{89821F94-BC26-4EE4-913A-7B932B9647AE}" type="datetimeFigureOut">
               <a:rPr lang="en-US" smtClean="0"/>
-              <a:t>12/14/2024</a:t>
+              <a:t>1/5/2025</a:t>
             </a:fld>
             <a:endParaRPr lang="en-US"/>
           </a:p>
@@ -3697,16 +3697,58 @@
           <a:lstStyle/>
           <a:p>
             <a:r>
-              <a:rPr lang="hu-HU"/>
+              <a:rPr lang="hu-HU" dirty="0"/>
               <a:t> </a:t>
             </a:r>
             <a:r>
-              <a:rPr lang="hu-HU" b="1"/>
+              <a:rPr lang="hu-HU" b="1" dirty="0"/>
               <a:t>Cél:</a:t>
             </a:r>
             <a:r>
-              <a:rPr lang="hu-HU"/>
-              <a:t> Az Online File Converter egyszerű és költséghatékony megoldást nyújt címkék generálására és testreszabására vállalkozások számára.</a:t>
+              <a:rPr lang="hu-HU" dirty="0"/>
+              <a:t> </a:t>
+            </a:r>
+          </a:p>
+          <a:p>
+            <a:pPr marL="0" indent="0">
+              <a:buNone/>
+            </a:pPr>
+            <a:r>
+              <a:rPr lang="hu-HU" dirty="0"/>
+              <a:t>Az Online File </a:t>
+            </a:r>
+            <a:r>
+              <a:rPr lang="hu-HU" dirty="0" err="1"/>
+              <a:t>Converter</a:t>
+            </a:r>
+            <a:r>
+              <a:rPr lang="hu-HU" dirty="0"/>
+              <a:t> egyszerű és költséghatékony megoldást nyújt címkék generálására és </a:t>
+            </a:r>
+            <a:r>
+              <a:rPr lang="hu-HU" dirty="0" err="1"/>
+              <a:t>testreszabására</a:t>
+            </a:r>
+            <a:r>
+              <a:rPr lang="hu-HU" dirty="0"/>
+              <a:t> vállalkozások számára.</a:t>
+            </a:r>
+          </a:p>
+          <a:p>
+            <a:pPr marL="0" indent="0">
+              <a:buNone/>
+            </a:pPr>
+            <a:r>
+              <a:rPr lang="hu-HU" dirty="0"/>
+              <a:t>Saját képek egyedi </a:t>
+            </a:r>
+            <a:r>
+              <a:rPr lang="hu-HU" dirty="0" err="1"/>
+              <a:t>vízjelezése</a:t>
+            </a:r>
+            <a:r>
+              <a:rPr lang="hu-HU" dirty="0"/>
+              <a:t>.</a:t>
             </a:r>
           </a:p>
           <a:p>
@@ -3715,16 +3757,37 @@
               <a:buChar char="•"/>
             </a:pPr>
             <a:r>
-              <a:rPr lang="hu-HU" b="1"/>
+              <a:rPr lang="hu-HU" b="1" dirty="0"/>
               <a:t>Motiváció:</a:t>
             </a:r>
-            <a:r>
-              <a:rPr lang="hu-HU"/>
+          </a:p>
+          <a:p>
+            <a:pPr marL="0" indent="0">
+              <a:buNone/>
+            </a:pPr>
+            <a:r>
+              <a:rPr lang="hu-HU" dirty="0"/>
               <a:t> Csökkenteni az autóalkatrészek címkézésével kapcsolatos költségeket és problémákat.</a:t>
             </a:r>
           </a:p>
           <a:p>
-            <a:endParaRPr lang="en-US"/>
+            <a:pPr marL="0" indent="0">
+              <a:buNone/>
+            </a:pPr>
+            <a:r>
+              <a:rPr lang="hu-HU" dirty="0"/>
+              <a:t>Egyedi szöveggel látja el a képeket.</a:t>
+            </a:r>
+          </a:p>
+          <a:p>
+            <a:pPr>
+              <a:buFont typeface="Arial" panose="020B0604020202020204" pitchFamily="34" charset="0"/>
+              <a:buChar char="•"/>
+            </a:pPr>
+            <a:endParaRPr lang="hu-HU" dirty="0"/>
+          </a:p>
+          <a:p>
+            <a:endParaRPr lang="en-US" dirty="0"/>
           </a:p>
         </p:txBody>
       </p:sp>
@@ -3813,7 +3876,7 @@
               <a:buChar char="•"/>
             </a:pPr>
             <a:r>
-              <a:rPr lang="hu-HU"/>
+              <a:rPr lang="hu-HU" dirty="0"/>
               <a:t>Címkék összeolvasztása különböző oldalakból.</a:t>
             </a:r>
           </a:p>
@@ -3823,8 +3886,8 @@
               <a:buChar char="•"/>
             </a:pPr>
             <a:r>
-              <a:rPr lang="hu-HU"/>
-              <a:t>A nyers fájlok feltöltése és az egyesített dokumentum letöltése.</a:t>
+              <a:rPr lang="hu-HU" dirty="0"/>
+              <a:t>Saját képek egyedi megjelölése.</a:t>
             </a:r>
           </a:p>
           <a:p>
@@ -3833,12 +3896,22 @@
               <a:buChar char="•"/>
             </a:pPr>
             <a:r>
-              <a:rPr lang="hu-HU"/>
+              <a:rPr lang="hu-HU" dirty="0"/>
+              <a:t>A nyers fájlok feltöltése és az egyesített dokumentum letöltése.</a:t>
+            </a:r>
+          </a:p>
+          <a:p>
+            <a:pPr>
+              <a:buFont typeface="Arial" panose="020B0604020202020204" pitchFamily="34" charset="0"/>
+              <a:buChar char="•"/>
+            </a:pPr>
+            <a:r>
+              <a:rPr lang="hu-HU" dirty="0"/>
               <a:t>Lokális használatra optimalizált.</a:t>
             </a:r>
           </a:p>
           <a:p>
-            <a:endParaRPr lang="hu-HU"/>
+            <a:endParaRPr lang="hu-HU" dirty="0"/>
           </a:p>
         </p:txBody>
       </p:sp>
@@ -4637,8 +4710,16 @@
               <a:buChar char="•"/>
             </a:pPr>
             <a:r>
-              <a:rPr lang="hu-HU"/>
-              <a:t>Az Online File Converter költséghatékony megoldás címkék kezelésére.</a:t>
+              <a:rPr lang="hu-HU" dirty="0"/>
+              <a:t>Az Online File </a:t>
+            </a:r>
+            <a:r>
+              <a:rPr lang="hu-HU" dirty="0" err="1"/>
+              <a:t>Converter</a:t>
+            </a:r>
+            <a:r>
+              <a:rPr lang="hu-HU" dirty="0"/>
+              <a:t> költséghatékony megoldás címkék kezelésére.</a:t>
             </a:r>
           </a:p>
           <a:p>
@@ -4647,8 +4728,8 @@
               <a:buChar char="•"/>
             </a:pPr>
             <a:r>
-              <a:rPr lang="hu-HU"/>
-              <a:t>Egyszerű használat és testreszabhatóság.</a:t>
+              <a:rPr lang="hu-HU" dirty="0"/>
+              <a:t>A feltöltött képek egyedi vízjellel biztosítottak.</a:t>
             </a:r>
           </a:p>
           <a:p>
@@ -4657,12 +4738,22 @@
               <a:buChar char="•"/>
             </a:pPr>
             <a:r>
-              <a:rPr lang="hu-HU"/>
+              <a:rPr lang="hu-HU" dirty="0"/>
+              <a:t>Egyszerű használat és testreszabhatóság.</a:t>
+            </a:r>
+          </a:p>
+          <a:p>
+            <a:pPr>
+              <a:buFont typeface="Arial" panose="020B0604020202020204" pitchFamily="34" charset="0"/>
+              <a:buChar char="•"/>
+            </a:pPr>
+            <a:r>
+              <a:rPr lang="hu-HU" dirty="0"/>
               <a:t>Fejlesztési lehetőségek biztosítják a jövőbeni bővítéseket.</a:t>
             </a:r>
           </a:p>
           <a:p>
-            <a:endParaRPr lang="hu-HU"/>
+            <a:endParaRPr lang="hu-HU" dirty="0"/>
           </a:p>
         </p:txBody>
       </p:sp>
@@ -4995,6 +5086,15 @@
 </file>
 
 <file path=customXml/item1.xml><?xml version="1.0" encoding="utf-8"?>
+<?mso-contentType ?>
+<FormTemplates xmlns="http://schemas.microsoft.com/sharepoint/v3/contenttype/forms">
+  <Display>DocumentLibraryForm</Display>
+  <Edit>DocumentLibraryForm</Edit>
+  <New>DocumentLibraryForm</New>
+</FormTemplates>
+</file>
+
+<file path=customXml/item2.xml><?xml version="1.0" encoding="utf-8"?>
 <ct:contentTypeSchema xmlns:ct="http://schemas.microsoft.com/office/2006/metadata/contentType" xmlns:ma="http://schemas.microsoft.com/office/2006/metadata/properties/metaAttributes" ct:_="" ma:_="" ma:contentTypeName="Dokument" ma:contentTypeID="0x0101002CA767446D91614AA3C27F5CD17F677A" ma:contentTypeVersion="11" ma:contentTypeDescription="Ein neues Dokument erstellen." ma:contentTypeScope="" ma:versionID="0e5fd0d554cd27555a13c7002edf2f31">
   <xsd:schema xmlns:xsd="http://www.w3.org/2001/XMLSchema" xmlns:xs="http://www.w3.org/2001/XMLSchema" xmlns:p="http://schemas.microsoft.com/office/2006/metadata/properties" xmlns:ns3="2d1605d9-cfd9-4fed-8d58-3dd383332259" targetNamespace="http://schemas.microsoft.com/office/2006/metadata/properties" ma:root="true" ma:fieldsID="87720667ab8722dadcae92c4c61d155e" ns3:_="">
     <xsd:import namespace="2d1605d9-cfd9-4fed-8d58-3dd383332259"/>
@@ -5180,15 +5280,6 @@
 </ct:contentTypeSchema>
 </file>
 
-<file path=customXml/item2.xml><?xml version="1.0" encoding="utf-8"?>
-<?mso-contentType ?>
-<FormTemplates xmlns="http://schemas.microsoft.com/sharepoint/v3/contenttype/forms">
-  <Display>DocumentLibraryForm</Display>
-  <Edit>DocumentLibraryForm</Edit>
-  <New>DocumentLibraryForm</New>
-</FormTemplates>
-</file>
-
 <file path=customXml/item3.xml><?xml version="1.0" encoding="utf-8"?>
 <p:properties xmlns:p="http://schemas.microsoft.com/office/2006/metadata/properties" xmlns:xsi="http://www.w3.org/2001/XMLSchema-instance" xmlns:pc="http://schemas.microsoft.com/office/infopath/2007/PartnerControls">
   <documentManagement>
@@ -5198,6 +5289,14 @@
 </file>
 
 <file path=customXml/itemProps1.xml><?xml version="1.0" encoding="utf-8"?>
+<ds:datastoreItem xmlns:ds="http://schemas.openxmlformats.org/officeDocument/2006/customXml" ds:itemID="{388E0608-4626-43A7-8A87-36AB70BD08DA}">
+  <ds:schemaRefs>
+    <ds:schemaRef ds:uri="http://schemas.microsoft.com/sharepoint/v3/contenttype/forms"/>
+  </ds:schemaRefs>
+</ds:datastoreItem>
+</file>
+
+<file path=customXml/itemProps2.xml><?xml version="1.0" encoding="utf-8"?>
 <ds:datastoreItem xmlns:ds="http://schemas.openxmlformats.org/officeDocument/2006/customXml" ds:itemID="{438ADFE8-071A-4E12-B011-63C89F3A1D11}">
   <ds:schemaRefs>
     <ds:schemaRef ds:uri="2d1605d9-cfd9-4fed-8d58-3dd383332259"/>
@@ -5212,14 +5311,6 @@
     <ds:schemaRef ds:uri="http://schemas.openxmlformats.org/package/2006/metadata/core-properties"/>
     <ds:schemaRef ds:uri="http://www.w3.org/2000/xmlns/"/>
     <ds:schemaRef ds:uri="http://www.w3.org/2001/XMLSchema"/>
-  </ds:schemaRefs>
-</ds:datastoreItem>
-</file>
-
-<file path=customXml/itemProps2.xml><?xml version="1.0" encoding="utf-8"?>
-<ds:datastoreItem xmlns:ds="http://schemas.openxmlformats.org/officeDocument/2006/customXml" ds:itemID="{388E0608-4626-43A7-8A87-36AB70BD08DA}">
-  <ds:schemaRefs>
-    <ds:schemaRef ds:uri="http://schemas.microsoft.com/sharepoint/v3/contenttype/forms"/>
   </ds:schemaRefs>
 </ds:datastoreItem>
 </file>

</xml_diff>